<commit_message>
Adding shadow state demo to deck
</commit_message>
<xml_diff>
--- a/EntityFramework7.pptx
+++ b/EntityFramework7.pptx
@@ -6,10 +6,10 @@
     <p:sldMasterId id="2147484245" r:id="rId5"/>
   </p:sldMasterIdLst>
   <p:notesMasterIdLst>
-    <p:notesMasterId r:id="rId19"/>
+    <p:notesMasterId r:id="rId20"/>
   </p:notesMasterIdLst>
   <p:handoutMasterIdLst>
-    <p:handoutMasterId r:id="rId20"/>
+    <p:handoutMasterId r:id="rId21"/>
   </p:handoutMasterIdLst>
   <p:sldIdLst>
     <p:sldId id="1200" r:id="rId6"/>
@@ -23,8 +23,9 @@
     <p:sldId id="1193" r:id="rId14"/>
     <p:sldId id="1194" r:id="rId15"/>
     <p:sldId id="1195" r:id="rId16"/>
-    <p:sldId id="1196" r:id="rId17"/>
-    <p:sldId id="1166" r:id="rId18"/>
+    <p:sldId id="1203" r:id="rId17"/>
+    <p:sldId id="1196" r:id="rId18"/>
+    <p:sldId id="1166" r:id="rId19"/>
   </p:sldIdLst>
   <p:sldSz cx="9144000" cy="5143500" type="screen16x9"/>
   <p:notesSz cx="9144000" cy="6858000"/>
@@ -334,7 +335,7 @@
               <a:rPr lang="en-US" smtClean="0">
                 <a:latin typeface="Segoe UI" pitchFamily="34" charset="0"/>
               </a:rPr>
-              <a:t>11/6/2014</a:t>
+              <a:t>12/8/2014</a:t>
             </a:fld>
             <a:endParaRPr lang="en-US" dirty="0">
               <a:latin typeface="Segoe UI" pitchFamily="34" charset="0"/>
@@ -730,7 +731,7 @@
             <a:fld id="{D51B1278-D92B-4AF3-A9C1-71DD298190CE}" type="datetimeFigureOut">
               <a:rPr lang="en-US" smtClean="0"/>
               <a:pPr/>
-              <a:t>11/6/2014</a:t>
+              <a:t>12/8/2014</a:t>
             </a:fld>
             <a:endParaRPr lang="en-US" dirty="0"/>
           </a:p>
@@ -6337,6 +6338,157 @@
           <a:p>
             <a:r>
               <a:rPr lang="en-US" sz="3600" dirty="0" smtClean="0"/>
+              <a:t>Shadow state properties</a:t>
+            </a:r>
+            <a:endParaRPr lang="en-US" sz="3600" dirty="0"/>
+          </a:p>
+        </p:txBody>
+      </p:sp>
+      <p:pic>
+        <p:nvPicPr>
+          <p:cNvPr id="7" name="Picture 6" descr="Native.png"/>
+          <p:cNvPicPr>
+            <a:picLocks noChangeAspect="1"/>
+          </p:cNvPicPr>
+          <p:nvPr/>
+        </p:nvPicPr>
+        <p:blipFill>
+          <a:blip r:embed="rId2">
+            <a:extLst>
+              <a:ext uri="{28A0092B-C50C-407E-A947-70E740481C1C}">
+                <a14:useLocalDpi xmlns:a14="http://schemas.microsoft.com/office/drawing/2010/main" val="0"/>
+              </a:ext>
+            </a:extLst>
+          </a:blip>
+          <a:stretch>
+            <a:fillRect/>
+          </a:stretch>
+        </p:blipFill>
+        <p:spPr>
+          <a:xfrm>
+            <a:off x="0" y="2590035"/>
+            <a:ext cx="3105211" cy="2399480"/>
+          </a:xfrm>
+          <a:prstGeom prst="rect">
+            <a:avLst/>
+          </a:prstGeom>
+        </p:spPr>
+      </p:pic>
+    </p:spTree>
+    <p:extLst>
+      <p:ext uri="{BB962C8B-B14F-4D97-AF65-F5344CB8AC3E}">
+        <p14:creationId xmlns:p14="http://schemas.microsoft.com/office/powerpoint/2010/main" val="2154038908"/>
+      </p:ext>
+    </p:extLst>
+  </p:cSld>
+  <p:clrMapOvr>
+    <a:masterClrMapping/>
+  </p:clrMapOvr>
+  <p:transition>
+    <p:fade/>
+  </p:transition>
+  <p:timing>
+    <p:tnLst>
+      <p:par>
+        <p:cTn id="1" dur="indefinite" restart="never" nodeType="tmRoot"/>
+      </p:par>
+    </p:tnLst>
+  </p:timing>
+</p:sld>
+</file>
+
+<file path=ppt/slides/slide13.xml><?xml version="1.0" encoding="utf-8"?>
+<p:sld xmlns:a="http://schemas.openxmlformats.org/drawingml/2006/main" xmlns:r="http://schemas.openxmlformats.org/officeDocument/2006/relationships" xmlns:p="http://schemas.openxmlformats.org/presentationml/2006/main">
+  <p:cSld>
+    <p:spTree>
+      <p:nvGrpSpPr>
+        <p:cNvPr id="1" name=""/>
+        <p:cNvGrpSpPr/>
+        <p:nvPr/>
+      </p:nvGrpSpPr>
+      <p:grpSpPr>
+        <a:xfrm>
+          <a:off x="0" y="0"/>
+          <a:ext cx="0" cy="0"/>
+          <a:chOff x="0" y="0"/>
+          <a:chExt cx="0" cy="0"/>
+        </a:xfrm>
+      </p:grpSpPr>
+      <p:sp>
+        <p:nvSpPr>
+          <p:cNvPr id="2" name="Title 1"/>
+          <p:cNvSpPr>
+            <a:spLocks noGrp="1"/>
+          </p:cNvSpPr>
+          <p:nvPr>
+            <p:ph type="title"/>
+          </p:nvPr>
+        </p:nvSpPr>
+        <p:spPr>
+          <a:xfrm>
+            <a:off x="269263" y="217136"/>
+            <a:ext cx="8600807" cy="956668"/>
+          </a:xfrm>
+        </p:spPr>
+        <p:txBody>
+          <a:bodyPr/>
+          <a:lstStyle/>
+          <a:p>
+            <a:r>
+              <a:rPr lang="en-US" sz="6400" dirty="0" smtClean="0"/>
+              <a:t>Demo</a:t>
+            </a:r>
+            <a:endParaRPr lang="en-US" sz="6400" dirty="0"/>
+          </a:p>
+        </p:txBody>
+      </p:sp>
+      <p:sp>
+        <p:nvSpPr>
+          <p:cNvPr id="6" name="Title 1"/>
+          <p:cNvSpPr txBox="1">
+            <a:spLocks/>
+          </p:cNvSpPr>
+          <p:nvPr/>
+        </p:nvSpPr>
+        <p:spPr>
+          <a:xfrm>
+            <a:off x="308173" y="1067094"/>
+            <a:ext cx="8600807" cy="956668"/>
+          </a:xfrm>
+          <a:prstGeom prst="rect">
+            <a:avLst/>
+          </a:prstGeom>
+        </p:spPr>
+        <p:txBody>
+          <a:bodyPr vert="horz" wrap="square" lIns="107536" tIns="67211" rIns="107536" bIns="67211" rtlCol="0" anchor="t">
+            <a:noAutofit/>
+          </a:bodyPr>
+          <a:lstStyle>
+            <a:lvl1pPr algn="l" defTabSz="685585" rtl="0" eaLnBrk="1" latinLnBrk="0" hangingPunct="1">
+              <a:lnSpc>
+                <a:spcPct val="90000"/>
+              </a:lnSpc>
+              <a:spcBef>
+                <a:spcPct val="0"/>
+              </a:spcBef>
+              <a:buNone/>
+              <a:defRPr lang="en-US" sz="3900" b="0" kern="1200" cap="none" spc="-75" baseline="0" dirty="0" smtClean="0">
+                <a:ln w="3175">
+                  <a:noFill/>
+                </a:ln>
+                <a:solidFill>
+                  <a:srgbClr val="616161"/>
+                </a:solidFill>
+                <a:effectLst/>
+                <a:latin typeface="+mj-lt"/>
+                <a:ea typeface="+mn-ea"/>
+                <a:cs typeface="Segoe UI" pitchFamily="34" charset="0"/>
+              </a:defRPr>
+            </a:lvl1pPr>
+          </a:lstStyle>
+          <a:p>
+            <a:r>
+              <a:rPr lang="en-US" sz="3600" dirty="0" smtClean="0"/>
               <a:t>Azure Table Storage</a:t>
             </a:r>
             <a:endParaRPr lang="en-US" sz="3600" dirty="0"/>
@@ -6396,7 +6548,7 @@
 </p:sld>
 </file>
 
-<file path=ppt/slides/slide13.xml><?xml version="1.0" encoding="utf-8"?>
+<file path=ppt/slides/slide14.xml><?xml version="1.0" encoding="utf-8"?>
 <p:sld xmlns:a="http://schemas.openxmlformats.org/drawingml/2006/main" xmlns:r="http://schemas.openxmlformats.org/officeDocument/2006/relationships" xmlns:p="http://schemas.openxmlformats.org/presentationml/2006/main">
   <p:cSld>
     <p:spTree>
@@ -9276,13 +9428,13 @@
   <p:clrMapOvr>
     <a:masterClrMapping/>
   </p:clrMapOvr>
-  <mc:AlternateContent xmlns:mc="http://schemas.openxmlformats.org/markup-compatibility/2006">
-    <mc:Choice xmlns:p14="http://schemas.microsoft.com/office/powerpoint/2010/main" Requires="p14">
+  <mc:AlternateContent xmlns:mc="http://schemas.openxmlformats.org/markup-compatibility/2006" xmlns:p14="http://schemas.microsoft.com/office/powerpoint/2010/main">
+    <mc:Choice Requires="p14">
       <p:transition spd="med" p14:dur="700">
         <p:fade/>
       </p:transition>
     </mc:Choice>
-    <mc:Fallback>
+    <mc:Fallback xmlns="">
       <p:transition spd="med">
         <p:fade/>
       </p:transition>
@@ -14270,12 +14422,9 @@
 </file>
 
 <file path=customXml/item1.xml><?xml version="1.0" encoding="utf-8"?>
-<?mso-contentType ?>
-<FormTemplates xmlns="http://schemas.microsoft.com/sharepoint/v3/contenttype/forms">
-  <Display>DocumentLibraryForm</Display>
-  <Edit>DocumentLibraryForm</Edit>
-  <New>DocumentLibraryForm</New>
-</FormTemplates>
+<p:properties xmlns:p="http://schemas.microsoft.com/office/2006/metadata/properties" xmlns:xsi="http://www.w3.org/2001/XMLSchema-instance" xmlns:pc="http://schemas.microsoft.com/office/infopath/2007/PartnerControls">
+  <documentManagement/>
+</p:properties>
 </file>
 
 <file path=customXml/item2.xml><?xml version="1.0" encoding="utf-8"?>
@@ -14419,15 +14568,19 @@
 </file>
 
 <file path=customXml/item3.xml><?xml version="1.0" encoding="utf-8"?>
-<p:properties xmlns:p="http://schemas.microsoft.com/office/2006/metadata/properties" xmlns:xsi="http://www.w3.org/2001/XMLSchema-instance" xmlns:pc="http://schemas.microsoft.com/office/infopath/2007/PartnerControls">
-  <documentManagement/>
-</p:properties>
+<?mso-contentType ?>
+<FormTemplates xmlns="http://schemas.microsoft.com/sharepoint/v3/contenttype/forms">
+  <Display>DocumentLibraryForm</Display>
+  <Edit>DocumentLibraryForm</Edit>
+  <New>DocumentLibraryForm</New>
+</FormTemplates>
 </file>
 
 <file path=customXml/itemProps1.xml><?xml version="1.0" encoding="utf-8"?>
-<ds:datastoreItem xmlns:ds="http://schemas.openxmlformats.org/officeDocument/2006/customXml" ds:itemID="{758FDAC0-319D-4A54-8D8E-1D42CB1F8004}">
+<ds:datastoreItem xmlns:ds="http://schemas.openxmlformats.org/officeDocument/2006/customXml" ds:itemID="{F990F116-B58F-4255-B05B-DA3808E0E5C6}">
   <ds:schemaRefs>
-    <ds:schemaRef ds:uri="http://schemas.microsoft.com/sharepoint/v3/contenttype/forms"/>
+    <ds:schemaRef ds:uri="http://schemas.microsoft.com/office/2006/metadata/properties"/>
+    <ds:schemaRef ds:uri="http://schemas.microsoft.com/office/infopath/2007/PartnerControls"/>
   </ds:schemaRefs>
 </ds:datastoreItem>
 </file>
@@ -14451,10 +14604,9 @@
 </file>
 
 <file path=customXml/itemProps3.xml><?xml version="1.0" encoding="utf-8"?>
-<ds:datastoreItem xmlns:ds="http://schemas.openxmlformats.org/officeDocument/2006/customXml" ds:itemID="{F990F116-B58F-4255-B05B-DA3808E0E5C6}">
+<ds:datastoreItem xmlns:ds="http://schemas.openxmlformats.org/officeDocument/2006/customXml" ds:itemID="{758FDAC0-319D-4A54-8D8E-1D42CB1F8004}">
   <ds:schemaRefs>
-    <ds:schemaRef ds:uri="http://schemas.microsoft.com/office/2006/metadata/properties"/>
-    <ds:schemaRef ds:uri="http://schemas.microsoft.com/office/infopath/2007/PartnerControls"/>
+    <ds:schemaRef ds:uri="http://schemas.microsoft.com/sharepoint/v3/contenttype/forms"/>
   </ds:schemaRefs>
 </ds:datastoreItem>
 </file>
</xml_diff>